<commit_message>
Mod - ferramentas utilizadas
</commit_message>
<xml_diff>
--- a/Apresentacao - Projeto final do Modulo 3.pptx
+++ b/Apresentacao - Projeto final do Modulo 3.pptx
@@ -12951,7 +12951,7 @@
         <p:spPr>
           <a:xfrm>
             <a:off x="1538050" y="2480050"/>
-            <a:ext cx="4601700" cy="1169700"/>
+            <a:ext cx="4601700" cy="1908600"/>
           </a:xfrm>
           <a:prstGeom prst="rect">
             <a:avLst/>
@@ -12979,7 +12979,7 @@
             </a:pPr>
             <a:r>
               <a:rPr lang="pt-BR" sz="1600"/>
-              <a:t>MySQL</a:t>
+              <a:t>MySql Server</a:t>
             </a:r>
             <a:endParaRPr sz="1600"/>
           </a:p>
@@ -12996,7 +12996,7 @@
             </a:pPr>
             <a:r>
               <a:rPr lang="pt-BR" sz="1600"/>
-              <a:t>xxxxxx</a:t>
+              <a:t>MySql Workbench</a:t>
             </a:r>
             <a:endParaRPr sz="1600"/>
           </a:p>
@@ -13013,7 +13013,58 @@
             </a:pPr>
             <a:r>
               <a:rPr lang="pt-BR" sz="1600"/>
-              <a:t>xxxxxx</a:t>
+              <a:t>Power BI</a:t>
+            </a:r>
+            <a:endParaRPr sz="1600"/>
+          </a:p>
+          <a:p>
+            <a:pPr indent="-330200" lvl="0" marL="457200" rtl="0" algn="l">
+              <a:spcBef>
+                <a:spcPts val="0"/>
+              </a:spcBef>
+              <a:spcAft>
+                <a:spcPts val="0"/>
+              </a:spcAft>
+              <a:buSzPts val="1600"/>
+              <a:buChar char="●"/>
+            </a:pPr>
+            <a:r>
+              <a:rPr lang="pt-BR" sz="1600"/>
+              <a:t>Excel</a:t>
+            </a:r>
+            <a:endParaRPr sz="1600"/>
+          </a:p>
+          <a:p>
+            <a:pPr indent="-330200" lvl="0" marL="457200" rtl="0" algn="l">
+              <a:spcBef>
+                <a:spcPts val="0"/>
+              </a:spcBef>
+              <a:spcAft>
+                <a:spcPts val="0"/>
+              </a:spcAft>
+              <a:buSzPts val="1600"/>
+              <a:buChar char="●"/>
+            </a:pPr>
+            <a:r>
+              <a:rPr lang="pt-BR" sz="1600"/>
+              <a:t>LibreOffice</a:t>
+            </a:r>
+            <a:endParaRPr sz="1600"/>
+          </a:p>
+          <a:p>
+            <a:pPr indent="-330200" lvl="0" marL="457200" rtl="0" algn="l">
+              <a:spcBef>
+                <a:spcPts val="0"/>
+              </a:spcBef>
+              <a:spcAft>
+                <a:spcPts val="0"/>
+              </a:spcAft>
+              <a:buSzPts val="1600"/>
+              <a:buChar char="●"/>
+            </a:pPr>
+            <a:r>
+              <a:rPr lang="pt-BR" sz="1600"/>
+              <a:t>PowerPoint</a:t>
             </a:r>
             <a:endParaRPr sz="1600"/>
           </a:p>

</xml_diff>